<commit_message>
Changes suggested by mitch
</commit_message>
<xml_diff>
--- a/Slides/Module 03.1 Trusting TypeScript.pptx
+++ b/Slides/Module 03.1 Trusting TypeScript.pptx
@@ -264,7 +264,7 @@
           <a:p>
             <a:fld id="{7C7E5181-6CF5-45F7-A87A-E0E0B1FD7549}" type="datetimeFigureOut">
               <a:rPr lang="en-US" smtClean="0"/>
-              <a:t>1/10/26</a:t>
+              <a:t>1/12/26</a:t>
             </a:fld>
             <a:endParaRPr lang="en-US"/>
           </a:p>
@@ -1572,15 +1572,15 @@
           <a:p>
             <a:r>
               <a:rPr lang="en-US" dirty="0"/>
-              <a:t>The third line (where the first arrow is pointing) covers an enormous amount of validation — it ensures that our web server will only respond to specific requests that send JSON data (we’ll be using JSON data a lot in the class, there’s an article about it in the </a:t>
+              <a:t>The third line where we “use” </a:t>
             </a:r>
             <a:r>
               <a:rPr lang="en-US" dirty="0" err="1"/>
-              <a:t>resoures</a:t>
+              <a:t>express.json</a:t>
             </a:r>
             <a:r>
               <a:rPr lang="en-US" dirty="0"/>
-              <a:t> for this lecture)</a:t>
+              <a:t>() covers an enormous amount of validation — it ensures that our web server will only respond to specific requests that send JSON data (we’ll be using JSON data a lot in the class, there’s an article about it in the resources for this lecture)</a:t>
             </a:r>
           </a:p>
           <a:p>
@@ -3646,7 +3646,7 @@
           <a:p>
             <a:fld id="{5D2A64DE-480B-420F-9649-4F8E696E08E0}" type="datetime1">
               <a:rPr lang="en-US" smtClean="0"/>
-              <a:t>1/10/26</a:t>
+              <a:t>1/12/26</a:t>
             </a:fld>
             <a:endParaRPr lang="en-US"/>
           </a:p>
@@ -3970,7 +3970,7 @@
           <a:p>
             <a:fld id="{EA476A42-A091-4468-A075-64A31BE59948}" type="datetime1">
               <a:rPr lang="en-US" smtClean="0"/>
-              <a:t>1/10/26</a:t>
+              <a:t>1/12/26</a:t>
             </a:fld>
             <a:endParaRPr lang="en-US"/>
           </a:p>
@@ -4168,7 +4168,7 @@
           <a:p>
             <a:fld id="{0D3616D0-8311-4107-9726-6B805E7D05BA}" type="datetime1">
               <a:rPr lang="en-US" smtClean="0"/>
-              <a:t>1/10/26</a:t>
+              <a:t>1/12/26</a:t>
             </a:fld>
             <a:endParaRPr lang="en-US"/>
           </a:p>
@@ -4376,7 +4376,7 @@
           <a:p>
             <a:fld id="{3BC2557A-5C88-417A-A763-5AC779462A5F}" type="datetime1">
               <a:rPr lang="en-US" smtClean="0"/>
-              <a:t>1/10/26</a:t>
+              <a:t>1/12/26</a:t>
             </a:fld>
             <a:endParaRPr lang="en-US"/>
           </a:p>
@@ -4798,7 +4798,7 @@
           <a:p>
             <a:fld id="{07C7BFD4-467E-4EDE-93EA-052F5B39A4E5}" type="datetime1">
               <a:rPr lang="en-US" smtClean="0"/>
-              <a:t>1/10/26</a:t>
+              <a:t>1/12/26</a:t>
             </a:fld>
             <a:endParaRPr lang="en-US"/>
           </a:p>
@@ -5048,7 +5048,7 @@
           <a:p>
             <a:fld id="{07C7BFD4-467E-4EDE-93EA-052F5B39A4E5}" type="datetime1">
               <a:rPr lang="en-US" smtClean="0"/>
-              <a:t>1/10/26</a:t>
+              <a:t>1/12/26</a:t>
             </a:fld>
             <a:endParaRPr lang="en-US"/>
           </a:p>
@@ -5230,7 +5230,7 @@
           <a:p>
             <a:fld id="{109E55A0-C911-4F03-82FC-7E5926047D46}" type="datetime1">
               <a:rPr lang="en-US" smtClean="0"/>
-              <a:t>1/10/26</a:t>
+              <a:t>1/12/26</a:t>
             </a:fld>
             <a:endParaRPr lang="en-US"/>
           </a:p>
@@ -5543,7 +5543,7 @@
           <a:p>
             <a:fld id="{A533CBE2-D5BE-47AC-ADC2-9CDFC1D0CF90}" type="datetime1">
               <a:rPr lang="en-US" smtClean="0"/>
-              <a:t>1/10/26</a:t>
+              <a:t>1/12/26</a:t>
             </a:fld>
             <a:endParaRPr lang="en-US"/>
           </a:p>
@@ -5844,7 +5844,7 @@
           <a:p>
             <a:fld id="{39B7EDB1-CE74-4951-85A2-0B01C2128E28}" type="datetime1">
               <a:rPr lang="en-US" smtClean="0"/>
-              <a:t>1/10/26</a:t>
+              <a:t>1/12/26</a:t>
             </a:fld>
             <a:endParaRPr lang="en-US"/>
           </a:p>
@@ -6292,7 +6292,7 @@
           <a:p>
             <a:fld id="{2BC7EB92-A5C2-4807-A9DC-9EDE6CBFB241}" type="datetime1">
               <a:rPr lang="en-US" smtClean="0"/>
-              <a:t>1/10/26</a:t>
+              <a:t>1/12/26</a:t>
             </a:fld>
             <a:endParaRPr lang="en-US"/>
           </a:p>
@@ -6405,7 +6405,7 @@
           <a:p>
             <a:fld id="{2B7B7EE0-7771-4CD5-9B2B-3550753A54A1}" type="datetime1">
               <a:rPr lang="en-US" smtClean="0"/>
-              <a:t>1/10/26</a:t>
+              <a:t>1/12/26</a:t>
             </a:fld>
             <a:endParaRPr lang="en-US"/>
           </a:p>
@@ -6716,7 +6716,7 @@
           <a:p>
             <a:fld id="{F8B318B3-0E87-4416-A9B8-D891968C2727}" type="datetime1">
               <a:rPr lang="en-US" smtClean="0"/>
-              <a:t>1/10/26</a:t>
+              <a:t>1/12/26</a:t>
             </a:fld>
             <a:endParaRPr lang="en-US"/>
           </a:p>
@@ -6957,7 +6957,7 @@
           <a:p>
             <a:fld id="{54D997E8-DDEE-43F1-8D9B-F8A1E11DE488}" type="datetime1">
               <a:rPr lang="en-US" smtClean="0"/>
-              <a:t>1/10/26</a:t>
+              <a:t>1/12/26</a:t>
             </a:fld>
             <a:endParaRPr lang="en-US"/>
           </a:p>
@@ -8748,7 +8748,7 @@
           <a:p>
             <a:r>
               <a:rPr lang="en-US" dirty="0"/>
-              <a:t>Untrusted Inputs Should Have </a:t>
+              <a:t>Untrusted Inputs Should Have Type </a:t>
             </a:r>
             <a:r>
               <a:rPr lang="en-US" dirty="0">
@@ -8759,20 +8759,8 @@
                 <a:ea typeface="Menlo" panose="020B0609030804020204" pitchFamily="49" charset="0"/>
                 <a:cs typeface="Consolas" panose="020B0609020204030204" pitchFamily="49" charset="0"/>
               </a:rPr>
-              <a:t>unknown </a:t>
-            </a:r>
-            <a:r>
-              <a:rPr lang="en-US" dirty="0"/>
-              <a:t>Type </a:t>
-            </a:r>
-            <a:endParaRPr lang="en-US" dirty="0">
-              <a:solidFill>
-                <a:srgbClr val="FF0000"/>
-              </a:solidFill>
-              <a:latin typeface="Consolas" panose="020B0609020204030204" pitchFamily="49" charset="0"/>
-              <a:ea typeface="Menlo" panose="020B0609030804020204" pitchFamily="49" charset="0"/>
-              <a:cs typeface="Consolas" panose="020B0609020204030204" pitchFamily="49" charset="0"/>
-            </a:endParaRPr>
+              <a:t>unknown</a:t>
+            </a:r>
           </a:p>
         </p:txBody>
       </p:sp>
@@ -9865,6 +9853,65 @@
               <a:ea typeface="Helvetica" panose="020B0604020202020204" pitchFamily="34" charset="0"/>
               <a:cs typeface="Calibri" panose="020F0502020204030204" pitchFamily="34" charset="0"/>
               <a:sym typeface="Helvetica" panose="020B0604020202020204" pitchFamily="34" charset="0"/>
+            </a:endParaRPr>
+          </a:p>
+        </p:txBody>
+      </p:sp>
+      <p:sp>
+        <p:nvSpPr>
+          <p:cNvPr id="5" name="TextBox 4">
+            <a:extLst>
+              <a:ext uri="{FF2B5EF4-FFF2-40B4-BE49-F238E27FC236}">
+                <a16:creationId xmlns:a16="http://schemas.microsoft.com/office/drawing/2014/main" id="{0A1FF862-8A7D-3FBB-64E0-B244D7C4022C}"/>
+              </a:ext>
+            </a:extLst>
+          </p:cNvPr>
+          <p:cNvSpPr txBox="1"/>
+          <p:nvPr/>
+        </p:nvSpPr>
+        <p:spPr>
+          <a:xfrm>
+            <a:off x="10621108" y="773723"/>
+            <a:ext cx="0" cy="0"/>
+          </a:xfrm>
+          <a:prstGeom prst="rect">
+            <a:avLst/>
+          </a:prstGeom>
+          <a:noFill/>
+          <a:ln>
+            <a:noFill/>
+          </a:ln>
+        </p:spPr>
+        <p:style>
+          <a:lnRef idx="2">
+            <a:schemeClr val="accent1">
+              <a:shade val="50000"/>
+            </a:schemeClr>
+          </a:lnRef>
+          <a:fillRef idx="1">
+            <a:schemeClr val="accent1"/>
+          </a:fillRef>
+          <a:effectRef idx="0">
+            <a:schemeClr val="accent1"/>
+          </a:effectRef>
+          <a:fontRef idx="minor">
+            <a:schemeClr val="lt1"/>
+          </a:fontRef>
+        </p:style>
+        <p:txBody>
+          <a:bodyPr rot="0" spcFirstLastPara="0" vertOverflow="overflow" horzOverflow="overflow" vert="horz" wrap="none" lIns="91440" tIns="45720" rIns="91440" bIns="45720" numCol="1" spcCol="0" rtlCol="0" fromWordArt="0" anchor="ctr" anchorCtr="0" forceAA="0" compatLnSpc="1">
+            <a:prstTxWarp prst="textNoShape">
+              <a:avLst/>
+            </a:prstTxWarp>
+            <a:noAutofit/>
+          </a:bodyPr>
+          <a:lstStyle/>
+          <a:p>
+            <a:pPr algn="l"/>
+            <a:endParaRPr lang="en-US" dirty="0">
+              <a:solidFill>
+                <a:schemeClr val="tx1"/>
+              </a:solidFill>
             </a:endParaRPr>
           </a:p>
         </p:txBody>
@@ -18660,7 +18707,7 @@
           <a:p>
             <a:r>
               <a:rPr lang="en-US" dirty="0"/>
-              <a:t>Zod Can Check Even More than TypeScript</a:t>
+              <a:t>Zod Can Check Conditions Even Finer than TypeScript Types</a:t>
             </a:r>
           </a:p>
         </p:txBody>

</xml_diff>